<commit_message>
Updated slides, added Presentation.xml
</commit_message>
<xml_diff>
--- a/WebCampsConclusion.pptx
+++ b/WebCampsConclusion.pptx
@@ -20831,41 +20831,7 @@
                   </a:gradFill>
                   <a:latin typeface="Segoe UI Light" pitchFamily="34" charset="0"/>
                 </a:rPr>
-                <a:t>[Speaker] </a:t>
-              </a:r>
-              <a:r>
-                <a:rPr lang="en-US" sz="2600" spc="-100" dirty="0" smtClean="0">
-                  <a:gradFill>
-                    <a:gsLst>
-                      <a:gs pos="0">
-                        <a:srgbClr val="595959"/>
-                      </a:gs>
-                      <a:gs pos="86000">
-                        <a:srgbClr val="595959"/>
-                      </a:gs>
-                    </a:gsLst>
-                    <a:lin ang="5400000" scaled="0"/>
-                  </a:gradFill>
-                  <a:latin typeface="Segoe UI Light" pitchFamily="34" charset="0"/>
-                </a:rPr>
-                <a:t>/ </a:t>
-              </a:r>
-              <a:r>
-                <a:rPr lang="en-US" sz="2600" spc="-100" dirty="0" smtClean="0">
-                  <a:gradFill>
-                    <a:gsLst>
-                      <a:gs pos="0">
-                        <a:srgbClr val="595959"/>
-                      </a:gs>
-                      <a:gs pos="86000">
-                        <a:srgbClr val="595959"/>
-                      </a:gs>
-                    </a:gsLst>
-                    <a:lin ang="5400000" scaled="0"/>
-                  </a:gradFill>
-                  <a:latin typeface="Segoe UI Light" pitchFamily="34" charset="0"/>
-                </a:rPr>
-                <a:t>[Twitter]</a:t>
+                <a:t>[Speaker] / [Twitter]</a:t>
               </a:r>
               <a:endParaRPr lang="en-US" sz="2600" spc="-100" dirty="0">
                 <a:gradFill>
@@ -23621,7 +23587,7 @@
           <a:graphicData uri="http://schemas.openxmlformats.org/presentationml/2006/ole">
             <mc:AlternateContent xmlns:mc="http://schemas.openxmlformats.org/markup-compatibility/2006">
               <mc:Choice xmlns:v="urn:schemas-microsoft-com:vml" Requires="v">
-                <p:oleObj spid="_x0000_s58479" name="think-cell Slide" r:id="rId5" imgW="270" imgH="270" progId="TCLayout.ActiveDocument.1">
+                <p:oleObj spid="_x0000_s58480" name="think-cell Slide" r:id="rId5" imgW="270" imgH="270" progId="TCLayout.ActiveDocument.1">
                   <p:embed/>
                 </p:oleObj>
               </mc:Choice>
@@ -23730,7 +23696,7 @@
           <a:graphicData uri="http://schemas.openxmlformats.org/presentationml/2006/ole">
             <mc:AlternateContent xmlns:mc="http://schemas.openxmlformats.org/markup-compatibility/2006">
               <mc:Choice xmlns:v="urn:schemas-microsoft-com:vml" Requires="v">
-                <p:oleObj spid="_x0000_s59500" name="think-cell Slide" r:id="rId5" imgW="270" imgH="270" progId="TCLayout.ActiveDocument.1">
+                <p:oleObj spid="_x0000_s59501" name="think-cell Slide" r:id="rId5" imgW="270" imgH="270" progId="TCLayout.ActiveDocument.1">
                   <p:embed/>
                 </p:oleObj>
               </mc:Choice>
@@ -23904,7 +23870,7 @@
           <a:graphicData uri="http://schemas.openxmlformats.org/presentationml/2006/ole">
             <mc:AlternateContent xmlns:mc="http://schemas.openxmlformats.org/markup-compatibility/2006">
               <mc:Choice xmlns:v="urn:schemas-microsoft-com:vml" Requires="v">
-                <p:oleObj spid="_x0000_s23669" name="think-cell Slide" r:id="rId7" imgW="270" imgH="270" progId="TCLayout.ActiveDocument.1">
+                <p:oleObj spid="_x0000_s23670" name="think-cell Slide" r:id="rId7" imgW="270" imgH="270" progId="TCLayout.ActiveDocument.1">
                   <p:embed/>
                 </p:oleObj>
               </mc:Choice>
@@ -24104,7 +24070,7 @@
           <a:graphicData uri="http://schemas.openxmlformats.org/presentationml/2006/ole">
             <mc:AlternateContent xmlns:mc="http://schemas.openxmlformats.org/markup-compatibility/2006">
               <mc:Choice xmlns:v="urn:schemas-microsoft-com:vml" Requires="v">
-                <p:oleObj spid="_x0000_s60495" name="think-cell Slide" r:id="rId5" imgW="270" imgH="270" progId="TCLayout.ActiveDocument.1">
+                <p:oleObj spid="_x0000_s60496" name="think-cell Slide" r:id="rId5" imgW="270" imgH="270" progId="TCLayout.ActiveDocument.1">
                   <p:embed/>
                 </p:oleObj>
               </mc:Choice>
@@ -27724,7 +27690,7 @@
           <a:graphicData uri="http://schemas.openxmlformats.org/presentationml/2006/ole">
             <mc:AlternateContent xmlns:mc="http://schemas.openxmlformats.org/markup-compatibility/2006">
               <mc:Choice xmlns:v="urn:schemas-microsoft-com:vml" Requires="v">
-                <p:oleObj spid="_x0000_s65597" name="think-cell Slide" r:id="rId5" imgW="270" imgH="270" progId="TCLayout.ActiveDocument.1">
+                <p:oleObj spid="_x0000_s65598" name="think-cell Slide" r:id="rId5" imgW="270" imgH="270" progId="TCLayout.ActiveDocument.1">
                   <p:embed/>
                 </p:oleObj>
               </mc:Choice>
@@ -29775,7 +29741,7 @@
           <a:graphicData uri="http://schemas.openxmlformats.org/presentationml/2006/ole">
             <mc:AlternateContent xmlns:mc="http://schemas.openxmlformats.org/markup-compatibility/2006">
               <mc:Choice xmlns:v="urn:schemas-microsoft-com:vml" Requires="v">
-                <p:oleObj spid="_x0000_s61522" name="think-cell Slide" r:id="rId5" imgW="270" imgH="270" progId="TCLayout.ActiveDocument.1">
+                <p:oleObj spid="_x0000_s61523" name="think-cell Slide" r:id="rId5" imgW="270" imgH="270" progId="TCLayout.ActiveDocument.1">
                   <p:embed/>
                 </p:oleObj>
               </mc:Choice>
@@ -31341,7 +31307,6 @@
               <a:rPr lang="en-US" sz="4800" dirty="0" smtClean="0"/>
               <a:t>[Twitter] </a:t>
             </a:r>
-            <a:endParaRPr lang="en-US" sz="4800" dirty="0" smtClean="0"/>
           </a:p>
           <a:p>
             <a:r>
@@ -32643,6 +32608,26 @@
 </file>
 
 <file path=customXml/item1.xml><?xml version="1.0" encoding="utf-8"?>
+<?mso-contentType ?>
+<FormTemplates xmlns="http://schemas.microsoft.com/sharepoint/v3/contenttype/forms">
+  <Display>DocumentLibraryForm</Display>
+  <Edit>DocumentLibraryForm</Edit>
+  <New>DocumentLibraryForm</New>
+</FormTemplates>
+</file>
+
+<file path=customXml/item2.xml><?xml version="1.0" encoding="utf-8"?>
+<p:properties xmlns:p="http://schemas.microsoft.com/office/2006/metadata/properties" xmlns:xsi="http://www.w3.org/2001/XMLSchema-instance" xmlns:pc="http://schemas.microsoft.com/office/infopath/2007/PartnerControls">
+  <documentManagement>
+    <TaxKeywordTaxHTField xmlns="230e9df3-be65-4c73-a93b-d1236ebd677e">
+      <Terms xmlns="http://schemas.microsoft.com/office/infopath/2007/PartnerControls"/>
+    </TaxKeywordTaxHTField>
+    <TaxCatchAll xmlns="230e9df3-be65-4c73-a93b-d1236ebd677e"/>
+  </documentManagement>
+</p:properties>
+</file>
+
+<file path=customXml/item3.xml><?xml version="1.0" encoding="utf-8"?>
 <ct:contentTypeSchema xmlns:ct="http://schemas.microsoft.com/office/2006/metadata/contentType" xmlns:ma="http://schemas.microsoft.com/office/2006/metadata/properties/metaAttributes" ct:_="" ma:_="" ma:contentTypeName="Document" ma:contentTypeID="0x010100CA05B43BE68FE54B90DD26FDFB72BB05" ma:contentTypeVersion="0" ma:contentTypeDescription="Create a new document." ma:contentTypeScope="" ma:versionID="6df1bece345c1749bd9b91e82fa4a03a">
   <xsd:schema xmlns:xsd="http://www.w3.org/2001/XMLSchema" xmlns:xs="http://www.w3.org/2001/XMLSchema" xmlns:p="http://schemas.microsoft.com/office/2006/metadata/properties" xmlns:ns2="230e9df3-be65-4c73-a93b-d1236ebd677e" targetNamespace="http://schemas.microsoft.com/office/2006/metadata/properties" ma:root="true" ma:fieldsID="e317b0b832c9845d3aae3abd1bb0954e" ns2:_="">
     <xsd:import namespace="230e9df3-be65-4c73-a93b-d1236ebd677e"/>
@@ -32794,40 +32779,10 @@
 </ct:contentTypeSchema>
 </file>
 
-<file path=customXml/item2.xml><?xml version="1.0" encoding="utf-8"?>
-<p:properties xmlns:p="http://schemas.microsoft.com/office/2006/metadata/properties" xmlns:xsi="http://www.w3.org/2001/XMLSchema-instance" xmlns:pc="http://schemas.microsoft.com/office/infopath/2007/PartnerControls">
-  <documentManagement>
-    <TaxKeywordTaxHTField xmlns="230e9df3-be65-4c73-a93b-d1236ebd677e">
-      <Terms xmlns="http://schemas.microsoft.com/office/infopath/2007/PartnerControls"/>
-    </TaxKeywordTaxHTField>
-    <TaxCatchAll xmlns="230e9df3-be65-4c73-a93b-d1236ebd677e"/>
-  </documentManagement>
-</p:properties>
-</file>
-
-<file path=customXml/item3.xml><?xml version="1.0" encoding="utf-8"?>
-<?mso-contentType ?>
-<FormTemplates xmlns="http://schemas.microsoft.com/sharepoint/v3/contenttype/forms">
-  <Display>DocumentLibraryForm</Display>
-  <Edit>DocumentLibraryForm</Edit>
-  <New>DocumentLibraryForm</New>
-</FormTemplates>
-</file>
-
 <file path=customXml/itemProps1.xml><?xml version="1.0" encoding="utf-8"?>
-<ds:datastoreItem xmlns:ds="http://schemas.openxmlformats.org/officeDocument/2006/customXml" ds:itemID="{8F590144-748D-417B-8B69-088F107B0F98}">
+<ds:datastoreItem xmlns:ds="http://schemas.openxmlformats.org/officeDocument/2006/customXml" ds:itemID="{B882D8D6-9D38-4159-A398-AAC3689D3D7C}">
   <ds:schemaRefs>
-    <ds:schemaRef ds:uri="http://schemas.microsoft.com/office/2006/metadata/contentType"/>
-    <ds:schemaRef ds:uri="http://schemas.microsoft.com/office/2006/metadata/properties/metaAttributes"/>
-    <ds:schemaRef ds:uri="http://www.w3.org/2001/XMLSchema"/>
-    <ds:schemaRef ds:uri="http://schemas.microsoft.com/office/2006/metadata/properties"/>
-    <ds:schemaRef ds:uri="230e9df3-be65-4c73-a93b-d1236ebd677e"/>
-    <ds:schemaRef ds:uri="http://schemas.microsoft.com/office/2006/documentManagement/types"/>
-    <ds:schemaRef ds:uri="http://schemas.microsoft.com/office/infopath/2007/PartnerControls"/>
-    <ds:schemaRef ds:uri="http://schemas.openxmlformats.org/package/2006/metadata/core-properties"/>
-    <ds:schemaRef ds:uri="http://purl.org/dc/elements/1.1/"/>
-    <ds:schemaRef ds:uri="http://purl.org/dc/terms/"/>
-    <ds:schemaRef ds:uri="http://schemas.microsoft.com/internal/obd"/>
+    <ds:schemaRef ds:uri="http://schemas.microsoft.com/sharepoint/v3/contenttype/forms"/>
   </ds:schemaRefs>
 </ds:datastoreItem>
 </file>
@@ -32849,9 +32804,19 @@
 </file>
 
 <file path=customXml/itemProps3.xml><?xml version="1.0" encoding="utf-8"?>
-<ds:datastoreItem xmlns:ds="http://schemas.openxmlformats.org/officeDocument/2006/customXml" ds:itemID="{B882D8D6-9D38-4159-A398-AAC3689D3D7C}">
+<ds:datastoreItem xmlns:ds="http://schemas.openxmlformats.org/officeDocument/2006/customXml" ds:itemID="{8F590144-748D-417B-8B69-088F107B0F98}">
   <ds:schemaRefs>
-    <ds:schemaRef ds:uri="http://schemas.microsoft.com/sharepoint/v3/contenttype/forms"/>
+    <ds:schemaRef ds:uri="http://schemas.microsoft.com/office/2006/metadata/contentType"/>
+    <ds:schemaRef ds:uri="http://schemas.microsoft.com/office/2006/metadata/properties/metaAttributes"/>
+    <ds:schemaRef ds:uri="http://www.w3.org/2001/XMLSchema"/>
+    <ds:schemaRef ds:uri="http://schemas.microsoft.com/office/2006/metadata/properties"/>
+    <ds:schemaRef ds:uri="230e9df3-be65-4c73-a93b-d1236ebd677e"/>
+    <ds:schemaRef ds:uri="http://schemas.microsoft.com/office/2006/documentManagement/types"/>
+    <ds:schemaRef ds:uri="http://schemas.microsoft.com/office/infopath/2007/PartnerControls"/>
+    <ds:schemaRef ds:uri="http://schemas.openxmlformats.org/package/2006/metadata/core-properties"/>
+    <ds:schemaRef ds:uri="http://purl.org/dc/elements/1.1/"/>
+    <ds:schemaRef ds:uri="http://purl.org/dc/terms/"/>
+    <ds:schemaRef ds:uri="http://schemas.microsoft.com/internal/obd"/>
   </ds:schemaRefs>
 </ds:datastoreItem>
 </file>
</xml_diff>

<commit_message>
Final checkin for 2012 tour
</commit_message>
<xml_diff>
--- a/WebCampsConclusion.pptx
+++ b/WebCampsConclusion.pptx
@@ -6,10 +6,10 @@
     <p:sldMasterId id="2147483779" r:id="rId5"/>
   </p:sldMasterIdLst>
   <p:notesMasterIdLst>
-    <p:notesMasterId r:id="rId21"/>
+    <p:notesMasterId r:id="rId20"/>
   </p:notesMasterIdLst>
   <p:handoutMasterIdLst>
-    <p:handoutMasterId r:id="rId22"/>
+    <p:handoutMasterId r:id="rId21"/>
   </p:handoutMasterIdLst>
   <p:sldIdLst>
     <p:sldId id="295" r:id="rId6"/>
@@ -19,45 +19,44 @@
     <p:sldId id="301" r:id="rId10"/>
     <p:sldId id="300" r:id="rId11"/>
     <p:sldId id="296" r:id="rId12"/>
-    <p:sldId id="303" r:id="rId13"/>
-    <p:sldId id="310" r:id="rId14"/>
-    <p:sldId id="305" r:id="rId15"/>
-    <p:sldId id="307" r:id="rId16"/>
-    <p:sldId id="308" r:id="rId17"/>
-    <p:sldId id="309" r:id="rId18"/>
-    <p:sldId id="306" r:id="rId19"/>
-    <p:sldId id="292" r:id="rId20"/>
+    <p:sldId id="310" r:id="rId13"/>
+    <p:sldId id="305" r:id="rId14"/>
+    <p:sldId id="307" r:id="rId15"/>
+    <p:sldId id="308" r:id="rId16"/>
+    <p:sldId id="309" r:id="rId17"/>
+    <p:sldId id="306" r:id="rId18"/>
+    <p:sldId id="292" r:id="rId19"/>
   </p:sldIdLst>
   <p:sldSz cx="12188825" cy="6858000"/>
   <p:notesSz cx="6858000" cy="9296400"/>
   <p:embeddedFontLst>
     <p:embeddedFont>
+      <p:font typeface="Consolas" panose="020B0609020204030204" pitchFamily="49" charset="0"/>
+      <p:regular r:id="rId22"/>
+      <p:bold r:id="rId23"/>
+      <p:italic r:id="rId24"/>
+      <p:boldItalic r:id="rId25"/>
+    </p:embeddedFont>
+    <p:embeddedFont>
+      <p:font typeface="Segoe Light" panose="020B0604020202020204" charset="0"/>
+      <p:regular r:id="rId26"/>
+      <p:italic r:id="rId27"/>
+    </p:embeddedFont>
+    <p:embeddedFont>
       <p:font typeface="Segoe UI Light" panose="020B0502040204020203" pitchFamily="34" charset="0"/>
-      <p:regular r:id="rId23"/>
-      <p:italic r:id="rId24"/>
+      <p:regular r:id="rId28"/>
+      <p:italic r:id="rId29"/>
     </p:embeddedFont>
     <p:embeddedFont>
       <p:font typeface="Segoe UI" panose="020B0502040204020203" pitchFamily="34" charset="0"/>
-      <p:regular r:id="rId25"/>
-      <p:bold r:id="rId26"/>
-      <p:italic r:id="rId27"/>
-      <p:boldItalic r:id="rId28"/>
-    </p:embeddedFont>
-    <p:embeddedFont>
-      <p:font typeface="Consolas" panose="020B0609020204030204" pitchFamily="49" charset="0"/>
-      <p:regular r:id="rId29"/>
-      <p:bold r:id="rId30"/>
-      <p:italic r:id="rId31"/>
-      <p:boldItalic r:id="rId32"/>
-    </p:embeddedFont>
-    <p:embeddedFont>
-      <p:font typeface="Segoe Light" panose="020B0604020202020204" charset="0"/>
-      <p:regular r:id="rId33"/>
-      <p:italic r:id="rId34"/>
+      <p:regular r:id="rId30"/>
+      <p:bold r:id="rId31"/>
+      <p:italic r:id="rId32"/>
+      <p:boldItalic r:id="rId33"/>
     </p:embeddedFont>
   </p:embeddedFontLst>
   <p:custDataLst>
-    <p:tags r:id="rId35"/>
+    <p:tags r:id="rId34"/>
   </p:custDataLst>
   <p:defaultTextStyle>
     <a:defPPr>
@@ -8219,7 +8218,7 @@
               <a:rPr lang="en-US" smtClean="0">
                 <a:latin typeface="Segoe UI" pitchFamily="34" charset="0"/>
               </a:rPr>
-              <a:t>12/21/2012</a:t>
+              <a:t>8/21/2013</a:t>
             </a:fld>
             <a:endParaRPr lang="en-US" dirty="0">
               <a:latin typeface="Segoe UI" pitchFamily="34" charset="0"/>
@@ -8401,7 +8400,7 @@
             <a:fld id="{CAE3F082-F902-42D8-A765-720E172C3194}" type="datetimeFigureOut">
               <a:rPr lang="en-US" smtClean="0"/>
               <a:pPr/>
-              <a:t>12/21/2012</a:t>
+              <a:t>8/21/2013</a:t>
             </a:fld>
             <a:endParaRPr lang="en-US" dirty="0"/>
           </a:p>
@@ -9621,7 +9620,7 @@
           <a:p>
             <a:fld id="{82AABF77-E2E4-44CA-BA5C-65E132CF08D8}" type="slidenum">
               <a:rPr lang="en-US" smtClean="0"/>
-              <a:t>15</a:t>
+              <a:t>14</a:t>
             </a:fld>
             <a:endParaRPr lang="en-US" dirty="0"/>
           </a:p>
@@ -22577,318 +22576,6 @@
 </file>
 
 <file path=ppt/slides/slide10.xml><?xml version="1.0" encoding="utf-8"?>
-<p:sld xmlns:a="http://schemas.openxmlformats.org/drawingml/2006/main" xmlns:r="http://schemas.openxmlformats.org/officeDocument/2006/relationships" xmlns:p="http://schemas.openxmlformats.org/presentationml/2006/main" show="0">
-  <p:cSld>
-    <p:spTree>
-      <p:nvGrpSpPr>
-        <p:cNvPr id="1" name=""/>
-        <p:cNvGrpSpPr/>
-        <p:nvPr/>
-      </p:nvGrpSpPr>
-      <p:grpSpPr>
-        <a:xfrm>
-          <a:off x="0" y="0"/>
-          <a:ext cx="0" cy="0"/>
-          <a:chOff x="0" y="0"/>
-          <a:chExt cx="0" cy="0"/>
-        </a:xfrm>
-      </p:grpSpPr>
-      <p:sp>
-        <p:nvSpPr>
-          <p:cNvPr id="2" name="Title 1"/>
-          <p:cNvSpPr>
-            <a:spLocks noGrp="1"/>
-          </p:cNvSpPr>
-          <p:nvPr>
-            <p:ph type="title"/>
-          </p:nvPr>
-        </p:nvSpPr>
-        <p:spPr/>
-        <p:txBody>
-          <a:bodyPr/>
-          <a:lstStyle/>
-          <a:p>
-            <a:r>
-              <a:rPr lang="en-US" dirty="0"/>
-              <a:t>Where to get more information</a:t>
-            </a:r>
-          </a:p>
-        </p:txBody>
-      </p:sp>
-      <p:sp>
-        <p:nvSpPr>
-          <p:cNvPr id="3" name="Text Placeholder 2"/>
-          <p:cNvSpPr>
-            <a:spLocks noGrp="1"/>
-          </p:cNvSpPr>
-          <p:nvPr>
-            <p:ph type="body" sz="quarter" idx="10"/>
-          </p:nvPr>
-        </p:nvSpPr>
-        <p:spPr>
-          <a:xfrm>
-            <a:off x="519112" y="1447799"/>
-            <a:ext cx="11149013" cy="7049622"/>
-          </a:xfrm>
-        </p:spPr>
-        <p:txBody>
-          <a:bodyPr/>
-          <a:lstStyle/>
-          <a:p>
-            <a:r>
-              <a:rPr lang="en-US" sz="2400" dirty="0" smtClean="0"/>
-              <a:t>Resources</a:t>
-            </a:r>
-          </a:p>
-          <a:p>
-            <a:pPr marL="574675" indent="-571500">
-              <a:buFont typeface="Arial" panose="020B0604020202020204" pitchFamily="34" charset="0"/>
-              <a:buChar char="•"/>
-            </a:pPr>
-            <a:r>
-              <a:rPr lang="en-US" sz="2400" dirty="0">
-                <a:hlinkClick r:id="rId2"/>
-              </a:rPr>
-              <a:t>http://</a:t>
-            </a:r>
-            <a:r>
-              <a:rPr lang="en-US" sz="2400" dirty="0" smtClean="0">
-                <a:hlinkClick r:id="rId2"/>
-              </a:rPr>
-              <a:t>bit.ly/vswebessentials</a:t>
-            </a:r>
-            <a:endParaRPr lang="en-US" sz="2400" dirty="0" smtClean="0"/>
-          </a:p>
-          <a:p>
-            <a:pPr marL="574675" indent="-571500">
-              <a:buFont typeface="Arial" panose="020B0604020202020204" pitchFamily="34" charset="0"/>
-              <a:buChar char="•"/>
-            </a:pPr>
-            <a:r>
-              <a:rPr lang="en-US" sz="2400" dirty="0">
-                <a:hlinkClick r:id="rId3"/>
-              </a:rPr>
-              <a:t>http://</a:t>
-            </a:r>
-            <a:r>
-              <a:rPr lang="en-US" sz="2400" dirty="0" smtClean="0">
-                <a:hlinkClick r:id="rId3"/>
-              </a:rPr>
-              <a:t>www.devcamps.ms</a:t>
-            </a:r>
-            <a:endParaRPr lang="en-US" sz="2400" dirty="0" smtClean="0"/>
-          </a:p>
-          <a:p>
-            <a:pPr marL="574675" indent="-571500">
-              <a:buFont typeface="Arial" panose="020B0604020202020204" pitchFamily="34" charset="0"/>
-              <a:buChar char="•"/>
-            </a:pPr>
-            <a:r>
-              <a:rPr lang="en-US" sz="2400">
-                <a:hlinkClick r:id="rId4"/>
-              </a:rPr>
-              <a:t>http://</a:t>
-            </a:r>
-            <a:r>
-              <a:rPr lang="en-US" sz="2400" smtClean="0">
-                <a:hlinkClick r:id="rId4"/>
-              </a:rPr>
-              <a:t>aka.ms/webcamps-training-kit</a:t>
-            </a:r>
-            <a:r>
-              <a:rPr lang="en-US" sz="2400" smtClean="0"/>
-              <a:t> </a:t>
-            </a:r>
-            <a:endParaRPr lang="en-US" sz="2400"/>
-          </a:p>
-          <a:p>
-            <a:pPr marL="574675" indent="-571500">
-              <a:buFont typeface="Arial" panose="020B0604020202020204" pitchFamily="34" charset="0"/>
-              <a:buChar char="•"/>
-            </a:pPr>
-            <a:r>
-              <a:rPr lang="en-US" sz="2400" dirty="0" smtClean="0">
-                <a:hlinkClick r:id="rId5"/>
-              </a:rPr>
-              <a:t>http</a:t>
-            </a:r>
-            <a:r>
-              <a:rPr lang="en-US" sz="2400" dirty="0">
-                <a:hlinkClick r:id="rId5"/>
-              </a:rPr>
-              <a:t>://docs.nuget.org</a:t>
-            </a:r>
-            <a:r>
-              <a:rPr lang="en-US" sz="2400" dirty="0" smtClean="0">
-                <a:hlinkClick r:id="rId5"/>
-              </a:rPr>
-              <a:t>/</a:t>
-            </a:r>
-            <a:endParaRPr lang="en-US" sz="2400" dirty="0" smtClean="0"/>
-          </a:p>
-          <a:p>
-            <a:pPr marL="574675" indent="-571500">
-              <a:buFont typeface="Arial" panose="020B0604020202020204" pitchFamily="34" charset="0"/>
-              <a:buChar char="•"/>
-            </a:pPr>
-            <a:r>
-              <a:rPr lang="en-US" sz="2400" dirty="0">
-                <a:hlinkClick r:id="rId6"/>
-              </a:rPr>
-              <a:t>http://</a:t>
-            </a:r>
-            <a:r>
-              <a:rPr lang="en-US" sz="2400" dirty="0" smtClean="0">
-                <a:hlinkClick r:id="rId6"/>
-              </a:rPr>
-              <a:t>nuget.codeplex.com/releases</a:t>
-            </a:r>
-            <a:endParaRPr lang="en-US" sz="2400" dirty="0" smtClean="0"/>
-          </a:p>
-          <a:p>
-            <a:pPr marL="574675" indent="-571500">
-              <a:buFont typeface="Arial" panose="020B0604020202020204" pitchFamily="34" charset="0"/>
-              <a:buChar char="•"/>
-            </a:pPr>
-            <a:r>
-              <a:rPr lang="en-US" sz="2400" dirty="0">
-                <a:hlinkClick r:id="rId7"/>
-              </a:rPr>
-              <a:t>http://</a:t>
-            </a:r>
-            <a:r>
-              <a:rPr lang="en-US" sz="2400" dirty="0" smtClean="0">
-                <a:hlinkClick r:id="rId7"/>
-              </a:rPr>
-              <a:t>www.asp.net/vnext</a:t>
-            </a:r>
-            <a:endParaRPr lang="en-US" sz="2400" dirty="0" smtClean="0"/>
-          </a:p>
-          <a:p>
-            <a:pPr marL="574675" indent="-571500">
-              <a:buFont typeface="Arial" panose="020B0604020202020204" pitchFamily="34" charset="0"/>
-              <a:buChar char="•"/>
-            </a:pPr>
-            <a:r>
-              <a:rPr lang="en-US" sz="2400" dirty="0">
-                <a:hlinkClick r:id="rId8"/>
-              </a:rPr>
-              <a:t>http://</a:t>
-            </a:r>
-            <a:r>
-              <a:rPr lang="en-US" sz="2400" dirty="0" smtClean="0">
-                <a:hlinkClick r:id="rId8"/>
-              </a:rPr>
-              <a:t>www.asp.net/web-api</a:t>
-            </a:r>
-            <a:endParaRPr lang="en-US" sz="2400" dirty="0" smtClean="0"/>
-          </a:p>
-          <a:p>
-            <a:pPr marL="574675" indent="-571500">
-              <a:buFont typeface="Arial" panose="020B0604020202020204" pitchFamily="34" charset="0"/>
-              <a:buChar char="•"/>
-            </a:pPr>
-            <a:r>
-              <a:rPr lang="en-US" sz="2400" dirty="0">
-                <a:hlinkClick r:id="rId9"/>
-              </a:rPr>
-              <a:t>http://www.windowsazure.com/en-us/develop/net</a:t>
-            </a:r>
-            <a:r>
-              <a:rPr lang="en-US" sz="2400" dirty="0" smtClean="0">
-                <a:hlinkClick r:id="rId9"/>
-              </a:rPr>
-              <a:t>/</a:t>
-            </a:r>
-            <a:endParaRPr lang="en-US" sz="2400" dirty="0" smtClean="0"/>
-          </a:p>
-          <a:p>
-            <a:pPr marL="574675" indent="-571500">
-              <a:buFont typeface="Arial" panose="020B0604020202020204" pitchFamily="34" charset="0"/>
-              <a:buChar char="•"/>
-            </a:pPr>
-            <a:r>
-              <a:rPr lang="en-US" sz="2400" dirty="0">
-                <a:hlinkClick r:id="rId10"/>
-              </a:rPr>
-              <a:t>http://www.windowsazure.com/en-us/develop/net/other-resources/training-kit</a:t>
-            </a:r>
-            <a:r>
-              <a:rPr lang="en-US" sz="2400" dirty="0" smtClean="0">
-                <a:hlinkClick r:id="rId10"/>
-              </a:rPr>
-              <a:t>/</a:t>
-            </a:r>
-            <a:endParaRPr lang="en-US" sz="2400" dirty="0" smtClean="0"/>
-          </a:p>
-          <a:p>
-            <a:pPr marL="574675" indent="-571500">
-              <a:buFont typeface="Arial" panose="020B0604020202020204" pitchFamily="34" charset="0"/>
-              <a:buChar char="•"/>
-            </a:pPr>
-            <a:endParaRPr lang="en-US" sz="2400" dirty="0" smtClean="0"/>
-          </a:p>
-          <a:p>
-            <a:pPr marL="574675" indent="-571500">
-              <a:buFont typeface="Arial" panose="020B0604020202020204" pitchFamily="34" charset="0"/>
-              <a:buChar char="•"/>
-            </a:pPr>
-            <a:endParaRPr lang="en-US" sz="2400" dirty="0" smtClean="0"/>
-          </a:p>
-          <a:p>
-            <a:pPr marL="574675" indent="-571500">
-              <a:buFont typeface="Arial" panose="020B0604020202020204" pitchFamily="34" charset="0"/>
-              <a:buChar char="•"/>
-            </a:pPr>
-            <a:endParaRPr lang="en-US" sz="2400" dirty="0" smtClean="0"/>
-          </a:p>
-          <a:p>
-            <a:pPr marL="574675" indent="-571500">
-              <a:buFont typeface="Arial" panose="020B0604020202020204" pitchFamily="34" charset="0"/>
-              <a:buChar char="•"/>
-            </a:pPr>
-            <a:endParaRPr lang="en-US" sz="2400" dirty="0" smtClean="0"/>
-          </a:p>
-          <a:p>
-            <a:pPr marL="574675" indent="-571500">
-              <a:buFont typeface="Arial" panose="020B0604020202020204" pitchFamily="34" charset="0"/>
-              <a:buChar char="•"/>
-            </a:pPr>
-            <a:endParaRPr lang="en-US" sz="2400" dirty="0" smtClean="0"/>
-          </a:p>
-          <a:p>
-            <a:pPr marL="574675" indent="-571500">
-              <a:buFont typeface="Arial" panose="020B0604020202020204" pitchFamily="34" charset="0"/>
-              <a:buChar char="•"/>
-            </a:pPr>
-            <a:endParaRPr lang="en-US" sz="2400" dirty="0"/>
-          </a:p>
-        </p:txBody>
-      </p:sp>
-    </p:spTree>
-    <p:extLst>
-      <p:ext uri="{BB962C8B-B14F-4D97-AF65-F5344CB8AC3E}">
-        <p14:creationId xmlns:p14="http://schemas.microsoft.com/office/powerpoint/2010/main" val="3439499755"/>
-      </p:ext>
-    </p:extLst>
-  </p:cSld>
-  <p:clrMapOvr>
-    <a:masterClrMapping/>
-  </p:clrMapOvr>
-  <p:transition>
-    <p:fade/>
-  </p:transition>
-  <p:timing>
-    <p:tnLst>
-      <p:par>
-        <p:cTn id="1" dur="indefinite" restart="never" nodeType="tmRoot"/>
-      </p:par>
-    </p:tnLst>
-  </p:timing>
-</p:sld>
-</file>
-
-<file path=ppt/slides/slide11.xml><?xml version="1.0" encoding="utf-8"?>
 <p:sld xmlns:a="http://schemas.openxmlformats.org/drawingml/2006/main" xmlns:r="http://schemas.openxmlformats.org/officeDocument/2006/relationships" xmlns:p="http://schemas.openxmlformats.org/presentationml/2006/main">
   <p:cSld>
     <p:spTree>
@@ -23060,8 +22747,8 @@
 </p:sld>
 </file>
 
-<file path=ppt/slides/slide12.xml><?xml version="1.0" encoding="utf-8"?>
-<p:sld xmlns:a="http://schemas.openxmlformats.org/drawingml/2006/main" xmlns:r="http://schemas.openxmlformats.org/officeDocument/2006/relationships" xmlns:p="http://schemas.openxmlformats.org/presentationml/2006/main">
+<file path=ppt/slides/slide11.xml><?xml version="1.0" encoding="utf-8"?>
+<p:sld xmlns:a="http://schemas.openxmlformats.org/drawingml/2006/main" xmlns:r="http://schemas.openxmlformats.org/officeDocument/2006/relationships" xmlns:p="http://schemas.openxmlformats.org/presentationml/2006/main" show="0">
   <p:cSld>
     <p:spTree>
       <p:nvGrpSpPr>
@@ -23112,7 +22799,7 @@
         <p:spPr>
           <a:xfrm>
             <a:off x="519112" y="1447799"/>
-            <a:ext cx="11149013" cy="4464299"/>
+            <a:ext cx="11149013" cy="4016484"/>
           </a:xfrm>
         </p:spPr>
         <p:txBody>
@@ -23174,24 +22861,27 @@
               <a:buChar char="•"/>
             </a:pPr>
             <a:r>
-              <a:rPr lang="en-US" dirty="0">
+              <a:rPr lang="en-US">
                 <a:hlinkClick r:id="rId4"/>
               </a:rPr>
               <a:t>http://</a:t>
             </a:r>
             <a:r>
-              <a:rPr lang="en-US" dirty="0" smtClean="0">
+              <a:rPr lang="en-US">
                 <a:hlinkClick r:id="rId4"/>
               </a:rPr>
-              <a:t>bit.ly/vswebessentials</a:t>
+              <a:t>vswebessentials.com</a:t>
             </a:r>
-            <a:endParaRPr lang="en-US" sz="2400" dirty="0" smtClean="0"/>
-          </a:p>
-          <a:p>
-            <a:pPr marL="574675" indent="-571500">
-              <a:buFont typeface="Arial" panose="020B0604020202020204" pitchFamily="34" charset="0"/>
-              <a:buChar char="•"/>
-            </a:pPr>
+            <a:r>
+              <a:rPr lang="en-US" smtClean="0">
+                <a:hlinkClick r:id="rId4"/>
+              </a:rPr>
+              <a:t>/</a:t>
+            </a:r>
+            <a:r>
+              <a:rPr lang="en-US" smtClean="0"/>
+              <a:t> </a:t>
+            </a:r>
             <a:endParaRPr lang="en-US" sz="2400" dirty="0" smtClean="0"/>
           </a:p>
           <a:p>
@@ -23240,7 +22930,7 @@
 </p:sld>
 </file>
 
-<file path=ppt/slides/slide13.xml><?xml version="1.0" encoding="utf-8"?>
+<file path=ppt/slides/slide12.xml><?xml version="1.0" encoding="utf-8"?>
 <p:sld xmlns:a="http://schemas.openxmlformats.org/drawingml/2006/main" xmlns:r="http://schemas.openxmlformats.org/officeDocument/2006/relationships" xmlns:p="http://schemas.openxmlformats.org/presentationml/2006/main">
   <p:cSld>
     <p:spTree>
@@ -23417,7 +23107,7 @@
 </p:sld>
 </file>
 
-<file path=ppt/slides/slide14.xml><?xml version="1.0" encoding="utf-8"?>
+<file path=ppt/slides/slide13.xml><?xml version="1.0" encoding="utf-8"?>
 <p:sld xmlns:a="http://schemas.openxmlformats.org/drawingml/2006/main" xmlns:r="http://schemas.openxmlformats.org/officeDocument/2006/relationships" xmlns:p="http://schemas.openxmlformats.org/presentationml/2006/main">
   <p:cSld>
     <p:spTree>
@@ -23545,7 +23235,7 @@
 </p:sld>
 </file>
 
-<file path=ppt/slides/slide15.xml><?xml version="1.0" encoding="utf-8"?>
+<file path=ppt/slides/slide14.xml><?xml version="1.0" encoding="utf-8"?>
 <p:sld xmlns:a="http://schemas.openxmlformats.org/drawingml/2006/main" xmlns:r="http://schemas.openxmlformats.org/officeDocument/2006/relationships" xmlns:p="http://schemas.openxmlformats.org/presentationml/2006/main">
   <p:cSld>
     <p:spTree>
@@ -23587,7 +23277,7 @@
           <a:graphicData uri="http://schemas.openxmlformats.org/presentationml/2006/ole">
             <mc:AlternateContent xmlns:mc="http://schemas.openxmlformats.org/markup-compatibility/2006">
               <mc:Choice xmlns:v="urn:schemas-microsoft-com:vml" Requires="v">
-                <p:oleObj spid="_x0000_s58480" name="think-cell Slide" r:id="rId5" imgW="270" imgH="270" progId="TCLayout.ActiveDocument.1">
+                <p:oleObj spid="_x0000_s58484" name="think-cell Slide" r:id="rId5" imgW="270" imgH="270" progId="TCLayout.ActiveDocument.1">
                   <p:embed/>
                 </p:oleObj>
               </mc:Choice>
@@ -23696,7 +23386,7 @@
           <a:graphicData uri="http://schemas.openxmlformats.org/presentationml/2006/ole">
             <mc:AlternateContent xmlns:mc="http://schemas.openxmlformats.org/markup-compatibility/2006">
               <mc:Choice xmlns:v="urn:schemas-microsoft-com:vml" Requires="v">
-                <p:oleObj spid="_x0000_s59501" name="think-cell Slide" r:id="rId5" imgW="270" imgH="270" progId="TCLayout.ActiveDocument.1">
+                <p:oleObj spid="_x0000_s59505" name="think-cell Slide" r:id="rId5" imgW="270" imgH="270" progId="TCLayout.ActiveDocument.1">
                   <p:embed/>
                 </p:oleObj>
               </mc:Choice>
@@ -23784,13 +23474,13 @@
           <a:p>
             <a:r>
               <a:rPr lang="en-US" dirty="0" smtClean="0"/>
-              <a:t>[Speaker]</a:t>
+              <a:t>Jon Galloway</a:t>
             </a:r>
           </a:p>
           <a:p>
             <a:r>
               <a:rPr lang="en-US" dirty="0" smtClean="0"/>
-              <a:t>[Company]</a:t>
+              <a:t>Microsoft</a:t>
             </a:r>
             <a:endParaRPr lang="en-US" dirty="0"/>
           </a:p>
@@ -23870,7 +23560,7 @@
           <a:graphicData uri="http://schemas.openxmlformats.org/presentationml/2006/ole">
             <mc:AlternateContent xmlns:mc="http://schemas.openxmlformats.org/markup-compatibility/2006">
               <mc:Choice xmlns:v="urn:schemas-microsoft-com:vml" Requires="v">
-                <p:oleObj spid="_x0000_s23670" name="think-cell Slide" r:id="rId7" imgW="270" imgH="270" progId="TCLayout.ActiveDocument.1">
+                <p:oleObj spid="_x0000_s23674" name="think-cell Slide" r:id="rId7" imgW="270" imgH="270" progId="TCLayout.ActiveDocument.1">
                   <p:embed/>
                 </p:oleObj>
               </mc:Choice>
@@ -24070,7 +23760,7 @@
           <a:graphicData uri="http://schemas.openxmlformats.org/presentationml/2006/ole">
             <mc:AlternateContent xmlns:mc="http://schemas.openxmlformats.org/markup-compatibility/2006">
               <mc:Choice xmlns:v="urn:schemas-microsoft-com:vml" Requires="v">
-                <p:oleObj spid="_x0000_s60496" name="think-cell Slide" r:id="rId5" imgW="270" imgH="270" progId="TCLayout.ActiveDocument.1">
+                <p:oleObj spid="_x0000_s60500" name="think-cell Slide" r:id="rId5" imgW="270" imgH="270" progId="TCLayout.ActiveDocument.1">
                   <p:embed/>
                 </p:oleObj>
               </mc:Choice>
@@ -27690,7 +27380,7 @@
           <a:graphicData uri="http://schemas.openxmlformats.org/presentationml/2006/ole">
             <mc:AlternateContent xmlns:mc="http://schemas.openxmlformats.org/markup-compatibility/2006">
               <mc:Choice xmlns:v="urn:schemas-microsoft-com:vml" Requires="v">
-                <p:oleObj spid="_x0000_s65598" name="think-cell Slide" r:id="rId5" imgW="270" imgH="270" progId="TCLayout.ActiveDocument.1">
+                <p:oleObj spid="_x0000_s65602" name="think-cell Slide" r:id="rId5" imgW="270" imgH="270" progId="TCLayout.ActiveDocument.1">
                   <p:embed/>
                 </p:oleObj>
               </mc:Choice>
@@ -29741,7 +29431,7 @@
           <a:graphicData uri="http://schemas.openxmlformats.org/presentationml/2006/ole">
             <mc:AlternateContent xmlns:mc="http://schemas.openxmlformats.org/markup-compatibility/2006">
               <mc:Choice xmlns:v="urn:schemas-microsoft-com:vml" Requires="v">
-                <p:oleObj spid="_x0000_s61523" name="think-cell Slide" r:id="rId5" imgW="270" imgH="270" progId="TCLayout.ActiveDocument.1">
+                <p:oleObj spid="_x0000_s61527" name="think-cell Slide" r:id="rId5" imgW="270" imgH="270" progId="TCLayout.ActiveDocument.1">
                   <p:embed/>
                 </p:oleObj>
               </mc:Choice>
@@ -30660,10 +30350,33 @@
             <p:ph type="title"/>
           </p:nvPr>
         </p:nvSpPr>
+        <p:spPr/>
+        <p:txBody>
+          <a:bodyPr/>
+          <a:lstStyle/>
+          <a:p>
+            <a:r>
+              <a:rPr lang="en-US" dirty="0" smtClean="0"/>
+              <a:t>ASP.NET Questions or Feedback</a:t>
+            </a:r>
+            <a:endParaRPr lang="en-US" dirty="0"/>
+          </a:p>
+        </p:txBody>
+      </p:sp>
+      <p:sp>
+        <p:nvSpPr>
+          <p:cNvPr id="3" name="Text Placeholder 2"/>
+          <p:cNvSpPr>
+            <a:spLocks noGrp="1"/>
+          </p:cNvSpPr>
+          <p:nvPr>
+            <p:ph type="body" sz="quarter" idx="10"/>
+          </p:nvPr>
+        </p:nvSpPr>
         <p:spPr>
           <a:xfrm>
-            <a:off x="519112" y="402776"/>
-            <a:ext cx="11149013" cy="747897"/>
+            <a:off x="519111" y="1179680"/>
+            <a:ext cx="11149013" cy="609398"/>
           </a:xfrm>
         </p:spPr>
         <p:txBody>
@@ -30671,541 +30384,29 @@
           <a:lstStyle/>
           <a:p>
             <a:r>
-              <a:rPr lang="en-US" dirty="0" smtClean="0"/>
-              <a:t>Who you can contact for help</a:t>
+              <a:rPr lang="en-US" sz="4400" dirty="0">
+                <a:hlinkClick r:id="rId2"/>
+              </a:rPr>
+              <a:t>http://</a:t>
             </a:r>
-            <a:endParaRPr lang="en-US" dirty="0"/>
+            <a:r>
+              <a:rPr lang="en-US" sz="4400" dirty="0" smtClean="0">
+                <a:hlinkClick r:id="rId2"/>
+              </a:rPr>
+              <a:t>www.asp.net/feedback</a:t>
+            </a:r>
+            <a:r>
+              <a:rPr lang="en-US" sz="4400" dirty="0" smtClean="0"/>
+              <a:t> </a:t>
+            </a:r>
+            <a:endParaRPr lang="en-US" sz="4400" dirty="0"/>
           </a:p>
         </p:txBody>
       </p:sp>
-      <p:graphicFrame>
-        <p:nvGraphicFramePr>
-          <p:cNvPr id="4" name="Table 3"/>
-          <p:cNvGraphicFramePr>
-            <a:graphicFrameLocks noGrp="1"/>
-          </p:cNvGraphicFramePr>
-          <p:nvPr>
-            <p:extLst>
-              <p:ext uri="{D42A27DB-BD31-4B8C-83A1-F6EECF244321}">
-                <p14:modId xmlns:p14="http://schemas.microsoft.com/office/powerpoint/2010/main" val="3774061710"/>
-              </p:ext>
-            </p:extLst>
-          </p:nvPr>
-        </p:nvGraphicFramePr>
-        <p:xfrm>
-          <a:off x="519111" y="1331130"/>
-          <a:ext cx="11257017" cy="3657600"/>
-        </p:xfrm>
-        <a:graphic>
-          <a:graphicData uri="http://schemas.openxmlformats.org/drawingml/2006/table">
-            <a:tbl>
-              <a:tblPr firstRow="1" bandRow="1">
-                <a:tableStyleId>{93296810-A885-4BE3-A3E7-6D5BEEA58F35}</a:tableStyleId>
-              </a:tblPr>
-              <a:tblGrid>
-                <a:gridCol w="2523892"/>
-                <a:gridCol w="5711253"/>
-                <a:gridCol w="3021872"/>
-              </a:tblGrid>
-              <a:tr h="370840">
-                <a:tc>
-                  <a:txBody>
-                    <a:bodyPr/>
-                    <a:lstStyle/>
-                    <a:p>
-                      <a:r>
-                        <a:rPr lang="en-US" sz="2400" dirty="0" smtClean="0"/>
-                        <a:t>Human</a:t>
-                      </a:r>
-                      <a:endParaRPr lang="en-US" sz="2400" dirty="0"/>
-                    </a:p>
-                  </a:txBody>
-                  <a:tcPr/>
-                </a:tc>
-                <a:tc>
-                  <a:txBody>
-                    <a:bodyPr/>
-                    <a:lstStyle/>
-                    <a:p>
-                      <a:r>
-                        <a:rPr lang="en-US" sz="2400" dirty="0" smtClean="0"/>
-                        <a:t>Title</a:t>
-                      </a:r>
-                      <a:endParaRPr lang="en-US" sz="2400" dirty="0"/>
-                    </a:p>
-                  </a:txBody>
-                  <a:tcPr/>
-                </a:tc>
-                <a:tc>
-                  <a:txBody>
-                    <a:bodyPr/>
-                    <a:lstStyle/>
-                    <a:p>
-                      <a:r>
-                        <a:rPr lang="en-US" sz="2400" dirty="0" smtClean="0"/>
-                        <a:t>Twitter</a:t>
-                      </a:r>
-                      <a:endParaRPr lang="en-US" sz="2400" dirty="0"/>
-                    </a:p>
-                  </a:txBody>
-                  <a:tcPr/>
-                </a:tc>
-              </a:tr>
-              <a:tr h="370840">
-                <a:tc>
-                  <a:txBody>
-                    <a:bodyPr/>
-                    <a:lstStyle/>
-                    <a:p>
-                      <a:r>
-                        <a:rPr lang="en-US" sz="2400" dirty="0" smtClean="0"/>
-                        <a:t>Jon Galloway</a:t>
-                      </a:r>
-                      <a:endParaRPr lang="en-US" sz="2400" dirty="0"/>
-                    </a:p>
-                  </a:txBody>
-                  <a:tcPr/>
-                </a:tc>
-                <a:tc>
-                  <a:txBody>
-                    <a:bodyPr/>
-                    <a:lstStyle/>
-                    <a:p>
-                      <a:r>
-                        <a:rPr lang="en-US" sz="2400" dirty="0" smtClean="0"/>
-                        <a:t>Technical</a:t>
-                      </a:r>
-                      <a:r>
-                        <a:rPr lang="en-US" sz="2400" baseline="0" dirty="0" smtClean="0"/>
-                        <a:t> Evangelist</a:t>
-                      </a:r>
-                      <a:endParaRPr lang="en-US" sz="2400" dirty="0"/>
-                    </a:p>
-                  </a:txBody>
-                  <a:tcPr/>
-                </a:tc>
-                <a:tc>
-                  <a:txBody>
-                    <a:bodyPr/>
-                    <a:lstStyle/>
-                    <a:p>
-                      <a:r>
-                        <a:rPr lang="en-US" sz="2400" dirty="0" smtClean="0"/>
-                        <a:t>@</a:t>
-                      </a:r>
-                      <a:r>
-                        <a:rPr lang="en-US" sz="2400" dirty="0" err="1" smtClean="0"/>
-                        <a:t>jongalloway</a:t>
-                      </a:r>
-                      <a:endParaRPr lang="en-US" sz="2400" dirty="0"/>
-                    </a:p>
-                  </a:txBody>
-                  <a:tcPr/>
-                </a:tc>
-              </a:tr>
-              <a:tr h="370840">
-                <a:tc>
-                  <a:txBody>
-                    <a:bodyPr/>
-                    <a:lstStyle/>
-                    <a:p>
-                      <a:r>
-                        <a:rPr lang="en-US" sz="2400" dirty="0" smtClean="0"/>
-                        <a:t>Brady Gaster</a:t>
-                      </a:r>
-                      <a:endParaRPr lang="en-US" sz="2400" dirty="0"/>
-                    </a:p>
-                  </a:txBody>
-                  <a:tcPr/>
-                </a:tc>
-                <a:tc>
-                  <a:txBody>
-                    <a:bodyPr/>
-                    <a:lstStyle/>
-                    <a:p>
-                      <a:r>
-                        <a:rPr lang="en-US" sz="2400" dirty="0" smtClean="0"/>
-                        <a:t>Technical Evangelist</a:t>
-                      </a:r>
-                      <a:endParaRPr lang="en-US" sz="2400" dirty="0"/>
-                    </a:p>
-                  </a:txBody>
-                  <a:tcPr/>
-                </a:tc>
-                <a:tc>
-                  <a:txBody>
-                    <a:bodyPr/>
-                    <a:lstStyle/>
-                    <a:p>
-                      <a:r>
-                        <a:rPr lang="en-US" sz="2400" dirty="0" smtClean="0"/>
-                        <a:t>@</a:t>
-                      </a:r>
-                      <a:r>
-                        <a:rPr lang="en-US" sz="2400" dirty="0" err="1" smtClean="0"/>
-                        <a:t>bradygaster</a:t>
-                      </a:r>
-                      <a:endParaRPr lang="en-US" sz="2400" dirty="0"/>
-                    </a:p>
-                  </a:txBody>
-                  <a:tcPr/>
-                </a:tc>
-              </a:tr>
-              <a:tr h="370840">
-                <a:tc>
-                  <a:txBody>
-                    <a:bodyPr/>
-                    <a:lstStyle/>
-                    <a:p>
-                      <a:r>
-                        <a:rPr lang="en-US" sz="2400" dirty="0" smtClean="0"/>
-                        <a:t>Vishal</a:t>
-                      </a:r>
-                      <a:r>
-                        <a:rPr lang="en-US" sz="2400" baseline="0" dirty="0" smtClean="0"/>
-                        <a:t> Joshi</a:t>
-                      </a:r>
-                      <a:endParaRPr lang="en-US" sz="2400" dirty="0"/>
-                    </a:p>
-                  </a:txBody>
-                  <a:tcPr/>
-                </a:tc>
-                <a:tc>
-                  <a:txBody>
-                    <a:bodyPr/>
-                    <a:lstStyle/>
-                    <a:p>
-                      <a:pPr marL="0" marR="0" indent="0" algn="l" defTabSz="914363" rtl="0" eaLnBrk="1" fontAlgn="auto" latinLnBrk="0" hangingPunct="1">
-                        <a:lnSpc>
-                          <a:spcPct val="100000"/>
-                        </a:lnSpc>
-                        <a:spcBef>
-                          <a:spcPts val="0"/>
-                        </a:spcBef>
-                        <a:spcAft>
-                          <a:spcPts val="0"/>
-                        </a:spcAft>
-                        <a:buClrTx/>
-                        <a:buSzTx/>
-                        <a:buFontTx/>
-                        <a:buNone/>
-                        <a:tabLst/>
-                        <a:defRPr/>
-                      </a:pPr>
-                      <a:r>
-                        <a:rPr lang="en-US" sz="2400" dirty="0" err="1" smtClean="0"/>
-                        <a:t>WebMatrix</a:t>
-                      </a:r>
-                      <a:r>
-                        <a:rPr lang="en-US" sz="2400" dirty="0" smtClean="0"/>
-                        <a:t> Principal</a:t>
-                      </a:r>
-                      <a:r>
-                        <a:rPr lang="en-US" sz="2400" baseline="0" dirty="0" smtClean="0"/>
-                        <a:t> PM</a:t>
-                      </a:r>
-                      <a:endParaRPr lang="en-US" sz="2400" dirty="0" smtClean="0"/>
-                    </a:p>
-                  </a:txBody>
-                  <a:tcPr/>
-                </a:tc>
-                <a:tc>
-                  <a:txBody>
-                    <a:bodyPr/>
-                    <a:lstStyle/>
-                    <a:p>
-                      <a:r>
-                        <a:rPr lang="en-US" sz="2400" dirty="0" smtClean="0"/>
-                        <a:t>@</a:t>
-                      </a:r>
-                      <a:r>
-                        <a:rPr lang="en-US" sz="2400" dirty="0" err="1" smtClean="0"/>
-                        <a:t>vishalrjoshi</a:t>
-                      </a:r>
-                      <a:endParaRPr lang="en-US" sz="2400" dirty="0"/>
-                    </a:p>
-                  </a:txBody>
-                  <a:tcPr/>
-                </a:tc>
-              </a:tr>
-              <a:tr h="370840">
-                <a:tc>
-                  <a:txBody>
-                    <a:bodyPr/>
-                    <a:lstStyle/>
-                    <a:p>
-                      <a:r>
-                        <a:rPr lang="en-US" sz="2400" dirty="0" smtClean="0"/>
-                        <a:t>Sayed Hashimi</a:t>
-                      </a:r>
-                      <a:endParaRPr lang="en-US" sz="2400" dirty="0"/>
-                    </a:p>
-                  </a:txBody>
-                  <a:tcPr/>
-                </a:tc>
-                <a:tc>
-                  <a:txBody>
-                    <a:bodyPr/>
-                    <a:lstStyle/>
-                    <a:p>
-                      <a:pPr marL="0" marR="0" indent="0" algn="l" defTabSz="914363" rtl="0" eaLnBrk="1" fontAlgn="auto" latinLnBrk="0" hangingPunct="1">
-                        <a:lnSpc>
-                          <a:spcPct val="100000"/>
-                        </a:lnSpc>
-                        <a:spcBef>
-                          <a:spcPts val="0"/>
-                        </a:spcBef>
-                        <a:spcAft>
-                          <a:spcPts val="0"/>
-                        </a:spcAft>
-                        <a:buClrTx/>
-                        <a:buSzTx/>
-                        <a:buFontTx/>
-                        <a:buNone/>
-                        <a:tabLst/>
-                        <a:defRPr/>
-                      </a:pPr>
-                      <a:r>
-                        <a:rPr lang="en-US" sz="2400" dirty="0" smtClean="0"/>
-                        <a:t>Visual Studio Web Deployment</a:t>
-                      </a:r>
-                      <a:r>
-                        <a:rPr lang="en-US" sz="2400" baseline="0" dirty="0" smtClean="0"/>
-                        <a:t> PM</a:t>
-                      </a:r>
-                      <a:endParaRPr lang="en-US" sz="2400" dirty="0" smtClean="0"/>
-                    </a:p>
-                  </a:txBody>
-                  <a:tcPr/>
-                </a:tc>
-                <a:tc>
-                  <a:txBody>
-                    <a:bodyPr/>
-                    <a:lstStyle/>
-                    <a:p>
-                      <a:r>
-                        <a:rPr lang="en-US" sz="2400" dirty="0" smtClean="0"/>
-                        <a:t>@</a:t>
-                      </a:r>
-                      <a:r>
-                        <a:rPr lang="en-US" sz="2400" dirty="0" err="1" smtClean="0"/>
-                        <a:t>sayedihashimi</a:t>
-                      </a:r>
-                      <a:endParaRPr lang="en-US" sz="2400" dirty="0"/>
-                    </a:p>
-                  </a:txBody>
-                  <a:tcPr/>
-                </a:tc>
-              </a:tr>
-              <a:tr h="370840">
-                <a:tc>
-                  <a:txBody>
-                    <a:bodyPr/>
-                    <a:lstStyle/>
-                    <a:p>
-                      <a:r>
-                        <a:rPr lang="en-US" sz="2400" dirty="0" smtClean="0"/>
-                        <a:t>Nir Mashkowski</a:t>
-                      </a:r>
-                      <a:endParaRPr lang="en-US" sz="2400" dirty="0"/>
-                    </a:p>
-                  </a:txBody>
-                  <a:tcPr/>
-                </a:tc>
-                <a:tc>
-                  <a:txBody>
-                    <a:bodyPr/>
-                    <a:lstStyle/>
-                    <a:p>
-                      <a:pPr marL="0" marR="0" indent="0" algn="l" defTabSz="914363" rtl="0" eaLnBrk="1" fontAlgn="auto" latinLnBrk="0" hangingPunct="1">
-                        <a:lnSpc>
-                          <a:spcPct val="100000"/>
-                        </a:lnSpc>
-                        <a:spcBef>
-                          <a:spcPts val="0"/>
-                        </a:spcBef>
-                        <a:spcAft>
-                          <a:spcPts val="0"/>
-                        </a:spcAft>
-                        <a:buClrTx/>
-                        <a:buSzTx/>
-                        <a:buFontTx/>
-                        <a:buNone/>
-                        <a:tabLst/>
-                        <a:defRPr/>
-                      </a:pPr>
-                      <a:r>
-                        <a:rPr lang="en-US" sz="2400" dirty="0" smtClean="0"/>
-                        <a:t>Windows Azure</a:t>
-                      </a:r>
-                      <a:r>
-                        <a:rPr lang="en-US" sz="2400" baseline="0" dirty="0" smtClean="0"/>
-                        <a:t> Web Sites Principal PM</a:t>
-                      </a:r>
-                      <a:endParaRPr lang="en-US" sz="2400" dirty="0" smtClean="0"/>
-                    </a:p>
-                  </a:txBody>
-                  <a:tcPr/>
-                </a:tc>
-                <a:tc>
-                  <a:txBody>
-                    <a:bodyPr/>
-                    <a:lstStyle/>
-                    <a:p>
-                      <a:r>
-                        <a:rPr lang="en-US" sz="2400" dirty="0" smtClean="0"/>
-                        <a:t>@</a:t>
-                      </a:r>
-                      <a:r>
-                        <a:rPr lang="en-US" sz="2400" dirty="0" err="1" smtClean="0"/>
-                        <a:t>nirmsk</a:t>
-                      </a:r>
-                      <a:endParaRPr lang="en-US" sz="2400" dirty="0"/>
-                    </a:p>
-                  </a:txBody>
-                  <a:tcPr/>
-                </a:tc>
-              </a:tr>
-              <a:tr h="370840">
-                <a:tc>
-                  <a:txBody>
-                    <a:bodyPr/>
-                    <a:lstStyle/>
-                    <a:p>
-                      <a:r>
-                        <a:rPr lang="en-US" sz="2400" dirty="0" smtClean="0"/>
-                        <a:t>Mads Kristensen</a:t>
-                      </a:r>
-                      <a:endParaRPr lang="en-US" sz="2400" dirty="0"/>
-                    </a:p>
-                  </a:txBody>
-                  <a:tcPr/>
-                </a:tc>
-                <a:tc>
-                  <a:txBody>
-                    <a:bodyPr/>
-                    <a:lstStyle/>
-                    <a:p>
-                      <a:pPr marL="0" marR="0" indent="0" algn="l" defTabSz="914363" rtl="0" eaLnBrk="1" fontAlgn="auto" latinLnBrk="0" hangingPunct="1">
-                        <a:lnSpc>
-                          <a:spcPct val="100000"/>
-                        </a:lnSpc>
-                        <a:spcBef>
-                          <a:spcPts val="0"/>
-                        </a:spcBef>
-                        <a:spcAft>
-                          <a:spcPts val="0"/>
-                        </a:spcAft>
-                        <a:buClrTx/>
-                        <a:buSzTx/>
-                        <a:buFontTx/>
-                        <a:buNone/>
-                        <a:tabLst/>
-                        <a:defRPr/>
-                      </a:pPr>
-                      <a:r>
-                        <a:rPr lang="en-US" sz="2400" dirty="0" smtClean="0"/>
-                        <a:t>Web Essentials PM</a:t>
-                      </a:r>
-                    </a:p>
-                  </a:txBody>
-                  <a:tcPr/>
-                </a:tc>
-                <a:tc>
-                  <a:txBody>
-                    <a:bodyPr/>
-                    <a:lstStyle/>
-                    <a:p>
-                      <a:r>
-                        <a:rPr lang="en-US" sz="2400" dirty="0" smtClean="0"/>
-                        <a:t>@</a:t>
-                      </a:r>
-                      <a:r>
-                        <a:rPr lang="en-US" sz="2400" dirty="0" err="1" smtClean="0"/>
-                        <a:t>mkristensen</a:t>
-                      </a:r>
-                      <a:endParaRPr lang="en-US" sz="2400" dirty="0"/>
-                    </a:p>
-                  </a:txBody>
-                  <a:tcPr/>
-                </a:tc>
-              </a:tr>
-              <a:tr h="370840">
-                <a:tc>
-                  <a:txBody>
-                    <a:bodyPr/>
-                    <a:lstStyle/>
-                    <a:p>
-                      <a:r>
-                        <a:rPr lang="en-US" sz="2400" dirty="0" smtClean="0"/>
-                        <a:t>Scott </a:t>
-                      </a:r>
-                      <a:r>
-                        <a:rPr lang="en-US" sz="2400" dirty="0" err="1" smtClean="0"/>
-                        <a:t>Hanselman</a:t>
-                      </a:r>
-                      <a:endParaRPr lang="en-US" sz="2400" dirty="0"/>
-                    </a:p>
-                  </a:txBody>
-                  <a:tcPr/>
-                </a:tc>
-                <a:tc>
-                  <a:txBody>
-                    <a:bodyPr/>
-                    <a:lstStyle/>
-                    <a:p>
-                      <a:pPr marL="0" marR="0" indent="0" algn="l" defTabSz="914363" rtl="0" eaLnBrk="1" fontAlgn="auto" latinLnBrk="0" hangingPunct="1">
-                        <a:lnSpc>
-                          <a:spcPct val="100000"/>
-                        </a:lnSpc>
-                        <a:spcBef>
-                          <a:spcPts val="0"/>
-                        </a:spcBef>
-                        <a:spcAft>
-                          <a:spcPts val="0"/>
-                        </a:spcAft>
-                        <a:buClrTx/>
-                        <a:buSzTx/>
-                        <a:buFontTx/>
-                        <a:buNone/>
-                        <a:tabLst/>
-                        <a:defRPr/>
-                      </a:pPr>
-                      <a:r>
-                        <a:rPr lang="en-US" sz="2400" dirty="0" smtClean="0"/>
-                        <a:t>Principal Program Manager, ASP.NET</a:t>
-                      </a:r>
-                    </a:p>
-                  </a:txBody>
-                  <a:tcPr/>
-                </a:tc>
-                <a:tc>
-                  <a:txBody>
-                    <a:bodyPr/>
-                    <a:lstStyle/>
-                    <a:p>
-                      <a:r>
-                        <a:rPr lang="en-US" sz="2400" dirty="0" smtClean="0"/>
-                        <a:t>@</a:t>
-                      </a:r>
-                      <a:r>
-                        <a:rPr lang="en-US" sz="2400" dirty="0" err="1" smtClean="0"/>
-                        <a:t>shanselman</a:t>
-                      </a:r>
-                      <a:endParaRPr lang="en-US" sz="2400" dirty="0"/>
-                    </a:p>
-                  </a:txBody>
-                  <a:tcPr/>
-                </a:tc>
-              </a:tr>
-            </a:tbl>
-          </a:graphicData>
-        </a:graphic>
-      </p:graphicFrame>
     </p:spTree>
     <p:extLst>
       <p:ext uri="{BB962C8B-B14F-4D97-AF65-F5344CB8AC3E}">
-        <p14:creationId xmlns:p14="http://schemas.microsoft.com/office/powerpoint/2010/main" val="4118501088"/>
+        <p14:creationId xmlns:p14="http://schemas.microsoft.com/office/powerpoint/2010/main" val="4026393942"/>
       </p:ext>
     </p:extLst>
   </p:cSld>
@@ -31258,10 +30459,9 @@
           <a:lstStyle/>
           <a:p>
             <a:r>
-              <a:rPr lang="en-US" dirty="0" smtClean="0"/>
-              <a:t>Questions</a:t>
+              <a:rPr lang="en-US" dirty="0"/>
+              <a:t>Where to get more information</a:t>
             </a:r>
-            <a:endParaRPr lang="en-US" dirty="0"/>
           </a:p>
         </p:txBody>
       </p:sp>
@@ -31277,8 +30477,8 @@
         </p:nvSpPr>
         <p:spPr>
           <a:xfrm>
-            <a:off x="519111" y="1179680"/>
-            <a:ext cx="11149013" cy="3005438"/>
+            <a:off x="519112" y="1447799"/>
+            <a:ext cx="11149013" cy="5410712"/>
           </a:xfrm>
         </p:spPr>
         <p:txBody>
@@ -31286,49 +30486,104 @@
           <a:lstStyle/>
           <a:p>
             <a:r>
-              <a:rPr lang="en-US" sz="4800" dirty="0">
+              <a:rPr lang="en-US" sz="3600" dirty="0" smtClean="0"/>
+              <a:t>ASP.NET and Visual Studio</a:t>
+            </a:r>
+          </a:p>
+          <a:p>
+            <a:pPr marL="574675" indent="-571500">
+              <a:buFont typeface="Arial" panose="020B0604020202020204" pitchFamily="34" charset="0"/>
+              <a:buChar char="•"/>
+            </a:pPr>
+            <a:r>
+              <a:rPr lang="en-US" sz="3600" dirty="0">
                 <a:hlinkClick r:id="rId2"/>
               </a:rPr>
               <a:t>http://</a:t>
             </a:r>
             <a:r>
-              <a:rPr lang="en-US" sz="4800" dirty="0" smtClean="0">
+              <a:rPr lang="en-US" sz="3600" dirty="0" smtClean="0">
                 <a:hlinkClick r:id="rId2"/>
               </a:rPr>
-              <a:t>www.asp.net/feedback</a:t>
+              <a:t>bit.ly/vswebessentials</a:t>
             </a:r>
-            <a:endParaRPr lang="en-US" sz="4800" dirty="0" smtClean="0"/>
+            <a:endParaRPr lang="en-US" sz="3600" dirty="0" smtClean="0"/>
           </a:p>
           <a:p>
-            <a:endParaRPr lang="en-US" sz="4800" dirty="0" smtClean="0"/>
+            <a:pPr marL="574675" indent="-571500">
+              <a:buFont typeface="Arial" panose="020B0604020202020204" pitchFamily="34" charset="0"/>
+              <a:buChar char="•"/>
+            </a:pPr>
+            <a:r>
+              <a:rPr lang="en-US" sz="3600" dirty="0" smtClean="0">
+                <a:hlinkClick r:id="rId3"/>
+              </a:rPr>
+              <a:t>http</a:t>
+            </a:r>
+            <a:r>
+              <a:rPr lang="en-US" sz="3600" dirty="0">
+                <a:hlinkClick r:id="rId3"/>
+              </a:rPr>
+              <a:t>://</a:t>
+            </a:r>
+            <a:r>
+              <a:rPr lang="en-US" sz="3600" dirty="0" smtClean="0">
+                <a:hlinkClick r:id="rId3"/>
+              </a:rPr>
+              <a:t>www.asp.net/vnext</a:t>
+            </a:r>
+            <a:endParaRPr lang="en-US" sz="3600" dirty="0" smtClean="0"/>
           </a:p>
           <a:p>
+            <a:pPr marL="574675" indent="-571500">
+              <a:buFont typeface="Arial" panose="020B0604020202020204" pitchFamily="34" charset="0"/>
+              <a:buChar char="•"/>
+            </a:pPr>
             <a:r>
-              <a:rPr lang="en-US" sz="4800" dirty="0" smtClean="0"/>
-              <a:t>[Twitter] </a:t>
+              <a:rPr lang="en-US" sz="3600" dirty="0" smtClean="0">
+                <a:hlinkClick r:id="rId4"/>
+              </a:rPr>
+              <a:t>http://www.microsoft.com/visualstudio</a:t>
             </a:r>
+            <a:endParaRPr lang="en-US" sz="3600" dirty="0" smtClean="0"/>
           </a:p>
           <a:p>
-            <a:r>
-              <a:rPr lang="en-US" sz="4800" dirty="0" smtClean="0"/>
-              <a:t>[</a:t>
-            </a:r>
-            <a:r>
-              <a:rPr lang="en-US" sz="4800" dirty="0" err="1" smtClean="0"/>
-              <a:t>EMail</a:t>
-            </a:r>
-            <a:r>
-              <a:rPr lang="en-US" sz="4800" dirty="0" smtClean="0"/>
-              <a:t>]</a:t>
-            </a:r>
-            <a:endParaRPr lang="en-US" sz="4800" dirty="0"/>
+            <a:pPr marL="574675" indent="-571500">
+              <a:buFont typeface="Arial" panose="020B0604020202020204" pitchFamily="34" charset="0"/>
+              <a:buChar char="•"/>
+            </a:pPr>
+            <a:endParaRPr lang="en-US" sz="3600" dirty="0" smtClean="0"/>
+          </a:p>
+          <a:p>
+            <a:endParaRPr lang="en-US" sz="3600" dirty="0" smtClean="0"/>
+          </a:p>
+          <a:p>
+            <a:pPr marL="574675" indent="-571500">
+              <a:buFont typeface="Arial" panose="020B0604020202020204" pitchFamily="34" charset="0"/>
+              <a:buChar char="•"/>
+            </a:pPr>
+            <a:endParaRPr lang="en-US" sz="3600" dirty="0" smtClean="0"/>
+          </a:p>
+          <a:p>
+            <a:pPr marL="574675" indent="-571500">
+              <a:buFont typeface="Arial" panose="020B0604020202020204" pitchFamily="34" charset="0"/>
+              <a:buChar char="•"/>
+            </a:pPr>
+            <a:endParaRPr lang="en-US" sz="3600" dirty="0" smtClean="0"/>
+          </a:p>
+          <a:p>
+            <a:pPr marL="574675" indent="-571500">
+              <a:buFont typeface="Arial" panose="020B0604020202020204" pitchFamily="34" charset="0"/>
+              <a:buChar char="•"/>
+            </a:pPr>
+            <a:endParaRPr lang="en-US" sz="3600" dirty="0"/>
           </a:p>
         </p:txBody>
       </p:sp>
     </p:spTree>
     <p:extLst>
       <p:ext uri="{BB962C8B-B14F-4D97-AF65-F5344CB8AC3E}">
-        <p14:creationId xmlns:p14="http://schemas.microsoft.com/office/powerpoint/2010/main" val="4026393942"/>
+        <p14:creationId xmlns:p14="http://schemas.microsoft.com/office/powerpoint/2010/main" val="3439499755"/>
       </p:ext>
     </p:extLst>
   </p:cSld>
@@ -32608,26 +31863,6 @@
 </file>
 
 <file path=customXml/item1.xml><?xml version="1.0" encoding="utf-8"?>
-<?mso-contentType ?>
-<FormTemplates xmlns="http://schemas.microsoft.com/sharepoint/v3/contenttype/forms">
-  <Display>DocumentLibraryForm</Display>
-  <Edit>DocumentLibraryForm</Edit>
-  <New>DocumentLibraryForm</New>
-</FormTemplates>
-</file>
-
-<file path=customXml/item2.xml><?xml version="1.0" encoding="utf-8"?>
-<p:properties xmlns:p="http://schemas.microsoft.com/office/2006/metadata/properties" xmlns:xsi="http://www.w3.org/2001/XMLSchema-instance" xmlns:pc="http://schemas.microsoft.com/office/infopath/2007/PartnerControls">
-  <documentManagement>
-    <TaxKeywordTaxHTField xmlns="230e9df3-be65-4c73-a93b-d1236ebd677e">
-      <Terms xmlns="http://schemas.microsoft.com/office/infopath/2007/PartnerControls"/>
-    </TaxKeywordTaxHTField>
-    <TaxCatchAll xmlns="230e9df3-be65-4c73-a93b-d1236ebd677e"/>
-  </documentManagement>
-</p:properties>
-</file>
-
-<file path=customXml/item3.xml><?xml version="1.0" encoding="utf-8"?>
 <ct:contentTypeSchema xmlns:ct="http://schemas.microsoft.com/office/2006/metadata/contentType" xmlns:ma="http://schemas.microsoft.com/office/2006/metadata/properties/metaAttributes" ct:_="" ma:_="" ma:contentTypeName="Document" ma:contentTypeID="0x010100CA05B43BE68FE54B90DD26FDFB72BB05" ma:contentTypeVersion="0" ma:contentTypeDescription="Create a new document." ma:contentTypeScope="" ma:versionID="6df1bece345c1749bd9b91e82fa4a03a">
   <xsd:schema xmlns:xsd="http://www.w3.org/2001/XMLSchema" xmlns:xs="http://www.w3.org/2001/XMLSchema" xmlns:p="http://schemas.microsoft.com/office/2006/metadata/properties" xmlns:ns2="230e9df3-be65-4c73-a93b-d1236ebd677e" targetNamespace="http://schemas.microsoft.com/office/2006/metadata/properties" ma:root="true" ma:fieldsID="e317b0b832c9845d3aae3abd1bb0954e" ns2:_="">
     <xsd:import namespace="230e9df3-be65-4c73-a93b-d1236ebd677e"/>
@@ -32779,10 +32014,40 @@
 </ct:contentTypeSchema>
 </file>
 
+<file path=customXml/item2.xml><?xml version="1.0" encoding="utf-8"?>
+<p:properties xmlns:p="http://schemas.microsoft.com/office/2006/metadata/properties" xmlns:xsi="http://www.w3.org/2001/XMLSchema-instance" xmlns:pc="http://schemas.microsoft.com/office/infopath/2007/PartnerControls">
+  <documentManagement>
+    <TaxKeywordTaxHTField xmlns="230e9df3-be65-4c73-a93b-d1236ebd677e">
+      <Terms xmlns="http://schemas.microsoft.com/office/infopath/2007/PartnerControls"/>
+    </TaxKeywordTaxHTField>
+    <TaxCatchAll xmlns="230e9df3-be65-4c73-a93b-d1236ebd677e"/>
+  </documentManagement>
+</p:properties>
+</file>
+
+<file path=customXml/item3.xml><?xml version="1.0" encoding="utf-8"?>
+<?mso-contentType ?>
+<FormTemplates xmlns="http://schemas.microsoft.com/sharepoint/v3/contenttype/forms">
+  <Display>DocumentLibraryForm</Display>
+  <Edit>DocumentLibraryForm</Edit>
+  <New>DocumentLibraryForm</New>
+</FormTemplates>
+</file>
+
 <file path=customXml/itemProps1.xml><?xml version="1.0" encoding="utf-8"?>
-<ds:datastoreItem xmlns:ds="http://schemas.openxmlformats.org/officeDocument/2006/customXml" ds:itemID="{B882D8D6-9D38-4159-A398-AAC3689D3D7C}">
+<ds:datastoreItem xmlns:ds="http://schemas.openxmlformats.org/officeDocument/2006/customXml" ds:itemID="{8F590144-748D-417B-8B69-088F107B0F98}">
   <ds:schemaRefs>
-    <ds:schemaRef ds:uri="http://schemas.microsoft.com/sharepoint/v3/contenttype/forms"/>
+    <ds:schemaRef ds:uri="http://schemas.microsoft.com/office/2006/metadata/contentType"/>
+    <ds:schemaRef ds:uri="http://schemas.microsoft.com/office/2006/metadata/properties/metaAttributes"/>
+    <ds:schemaRef ds:uri="http://www.w3.org/2001/XMLSchema"/>
+    <ds:schemaRef ds:uri="http://schemas.microsoft.com/office/2006/metadata/properties"/>
+    <ds:schemaRef ds:uri="230e9df3-be65-4c73-a93b-d1236ebd677e"/>
+    <ds:schemaRef ds:uri="http://schemas.microsoft.com/office/2006/documentManagement/types"/>
+    <ds:schemaRef ds:uri="http://schemas.microsoft.com/office/infopath/2007/PartnerControls"/>
+    <ds:schemaRef ds:uri="http://schemas.openxmlformats.org/package/2006/metadata/core-properties"/>
+    <ds:schemaRef ds:uri="http://purl.org/dc/elements/1.1/"/>
+    <ds:schemaRef ds:uri="http://purl.org/dc/terms/"/>
+    <ds:schemaRef ds:uri="http://schemas.microsoft.com/internal/obd"/>
   </ds:schemaRefs>
 </ds:datastoreItem>
 </file>
@@ -32804,19 +32069,9 @@
 </file>
 
 <file path=customXml/itemProps3.xml><?xml version="1.0" encoding="utf-8"?>
-<ds:datastoreItem xmlns:ds="http://schemas.openxmlformats.org/officeDocument/2006/customXml" ds:itemID="{8F590144-748D-417B-8B69-088F107B0F98}">
+<ds:datastoreItem xmlns:ds="http://schemas.openxmlformats.org/officeDocument/2006/customXml" ds:itemID="{B882D8D6-9D38-4159-A398-AAC3689D3D7C}">
   <ds:schemaRefs>
-    <ds:schemaRef ds:uri="http://schemas.microsoft.com/office/2006/metadata/contentType"/>
-    <ds:schemaRef ds:uri="http://schemas.microsoft.com/office/2006/metadata/properties/metaAttributes"/>
-    <ds:schemaRef ds:uri="http://www.w3.org/2001/XMLSchema"/>
-    <ds:schemaRef ds:uri="http://schemas.microsoft.com/office/2006/metadata/properties"/>
-    <ds:schemaRef ds:uri="230e9df3-be65-4c73-a93b-d1236ebd677e"/>
-    <ds:schemaRef ds:uri="http://schemas.microsoft.com/office/2006/documentManagement/types"/>
-    <ds:schemaRef ds:uri="http://schemas.microsoft.com/office/infopath/2007/PartnerControls"/>
-    <ds:schemaRef ds:uri="http://schemas.openxmlformats.org/package/2006/metadata/core-properties"/>
-    <ds:schemaRef ds:uri="http://purl.org/dc/elements/1.1/"/>
-    <ds:schemaRef ds:uri="http://purl.org/dc/terms/"/>
-    <ds:schemaRef ds:uri="http://schemas.microsoft.com/internal/obd"/>
+    <ds:schemaRef ds:uri="http://schemas.microsoft.com/sharepoint/v3/contenttype/forms"/>
   </ds:schemaRefs>
 </ds:datastoreItem>
 </file>
</xml_diff>